<commit_message>
this is first commit
</commit_message>
<xml_diff>
--- a/git1.pptx
+++ b/git1.pptx
@@ -217,7 +217,7 @@
           <a:p>
             <a:fld id="{79589E80-6DB1-4834-9C6B-95D67916B1ED}" type="datetimeFigureOut">
               <a:rPr lang="en-US" smtClean="0"/>
-              <a:t>12/24/2017</a:t>
+              <a:t>12/25/2017</a:t>
             </a:fld>
             <a:endParaRPr lang="en-US"/>
           </a:p>
@@ -905,7 +905,7 @@
             <a:fld id="{5923F103-BC34-4FE4-A40E-EDDEECFDA5D0}" type="datetimeFigureOut">
               <a:rPr lang="en-US" dirty="0"/>
               <a:pPr/>
-              <a:t>12/24/2017</a:t>
+              <a:t>12/25/2017</a:t>
             </a:fld>
             <a:endParaRPr lang="en-US" dirty="0"/>
           </a:p>
@@ -1993,7 +1993,7 @@
           <a:p>
             <a:fld id="{923A1CC3-2375-41D4-9E03-427CAF2A4C1A}" type="datetimeFigureOut">
               <a:rPr lang="en-US" dirty="0"/>
-              <a:t>12/24/2017</a:t>
+              <a:t>12/25/2017</a:t>
             </a:fld>
             <a:endParaRPr lang="en-US" dirty="0"/>
           </a:p>
@@ -2973,7 +2973,7 @@
           <a:p>
             <a:fld id="{AFF16868-8199-4C2C-A5B1-63AEE139F88E}" type="datetimeFigureOut">
               <a:rPr lang="en-US" dirty="0"/>
-              <a:t>12/24/2017</a:t>
+              <a:t>12/25/2017</a:t>
             </a:fld>
             <a:endParaRPr lang="en-US" dirty="0"/>
           </a:p>
@@ -4107,7 +4107,7 @@
           <a:p>
             <a:fld id="{AAD9FF7F-6988-44CC-821B-644E70CD2F73}" type="datetimeFigureOut">
               <a:rPr lang="en-US" dirty="0"/>
-              <a:t>12/24/2017</a:t>
+              <a:t>12/25/2017</a:t>
             </a:fld>
             <a:endParaRPr lang="en-US" dirty="0"/>
           </a:p>
@@ -5140,7 +5140,7 @@
           <a:p>
             <a:fld id="{5C12C299-16B2-4475-990D-751901EACC14}" type="datetimeFigureOut">
               <a:rPr lang="en-US" dirty="0"/>
-              <a:t>12/24/2017</a:t>
+              <a:t>12/25/2017</a:t>
             </a:fld>
             <a:endParaRPr lang="en-US" dirty="0"/>
           </a:p>
@@ -5800,7 +5800,7 @@
           <a:p>
             <a:fld id="{9FE86839-B9D8-4651-8783-F325ECE74E65}" type="datetimeFigureOut">
               <a:rPr lang="en-US" dirty="0"/>
-              <a:t>12/24/2017</a:t>
+              <a:t>12/25/2017</a:t>
             </a:fld>
             <a:endParaRPr lang="en-US" dirty="0"/>
           </a:p>
@@ -6661,7 +6661,7 @@
           <a:p>
             <a:fld id="{FD484F64-32F6-45C5-931F-ADC1662401D0}" type="datetimeFigureOut">
               <a:rPr lang="en-US" dirty="0"/>
-              <a:t>12/24/2017</a:t>
+              <a:t>12/25/2017</a:t>
             </a:fld>
             <a:endParaRPr lang="en-US" dirty="0"/>
           </a:p>
@@ -6851,7 +6851,7 @@
           <a:p>
             <a:fld id="{53086D93-FCAC-47E0-A2EE-787E62CA814C}" type="datetimeFigureOut">
               <a:rPr lang="en-US" dirty="0"/>
-              <a:t>12/24/2017</a:t>
+              <a:t>12/25/2017</a:t>
             </a:fld>
             <a:endParaRPr lang="en-US" dirty="0"/>
           </a:p>
@@ -7823,7 +7823,7 @@
           <a:p>
             <a:fld id="{CDA879A6-0FD0-4734-A311-86BFCA472E6E}" type="datetimeFigureOut">
               <a:rPr lang="en-US" dirty="0"/>
-              <a:t>12/24/2017</a:t>
+              <a:t>12/25/2017</a:t>
             </a:fld>
             <a:endParaRPr lang="en-US" dirty="0"/>
           </a:p>
@@ -8034,7 +8034,7 @@
           <a:p>
             <a:fld id="{19C9CA7B-DFD4-44B5-8C60-D14B8CD1FB59}" type="datetimeFigureOut">
               <a:rPr lang="en-US" dirty="0"/>
-              <a:t>12/24/2017</a:t>
+              <a:t>12/25/2017</a:t>
             </a:fld>
             <a:endParaRPr lang="en-US" dirty="0"/>
           </a:p>
@@ -9068,7 +9068,7 @@
           <a:p>
             <a:fld id="{F34E6425-0181-43F2-84FC-787E803FD2F8}" type="datetimeFigureOut">
               <a:rPr lang="en-US" dirty="0"/>
-              <a:t>12/24/2017</a:t>
+              <a:t>12/25/2017</a:t>
             </a:fld>
             <a:endParaRPr lang="en-US" dirty="0"/>
           </a:p>
@@ -9340,7 +9340,7 @@
           <a:p>
             <a:fld id="{3BDB8791-F1B0-41E7-B7FD-A781E65C4266}" type="datetimeFigureOut">
               <a:rPr lang="en-US" dirty="0"/>
-              <a:t>12/24/2017</a:t>
+              <a:t>12/25/2017</a:t>
             </a:fld>
             <a:endParaRPr lang="en-US" dirty="0"/>
           </a:p>
@@ -9750,7 +9750,7 @@
           <a:p>
             <a:fld id="{5FDD63B2-E120-4ED8-B27B-C685F510A5FE}" type="datetimeFigureOut">
               <a:rPr lang="en-US" dirty="0"/>
-              <a:t>12/24/2017</a:t>
+              <a:t>12/25/2017</a:t>
             </a:fld>
             <a:endParaRPr lang="en-US" dirty="0"/>
           </a:p>
@@ -9877,7 +9877,7 @@
           <a:p>
             <a:fld id="{7AA18ACC-A947-437B-A130-35BD54FDF1E9}" type="datetimeFigureOut">
               <a:rPr lang="en-US" dirty="0"/>
-              <a:t>12/24/2017</a:t>
+              <a:t>12/25/2017</a:t>
             </a:fld>
             <a:endParaRPr lang="en-US" dirty="0"/>
           </a:p>
@@ -9972,7 +9972,7 @@
           <a:p>
             <a:fld id="{7C8D7E02-BCB8-4D50-A234-369438C08659}" type="datetimeFigureOut">
               <a:rPr lang="en-US" dirty="0"/>
-              <a:t>12/24/2017</a:t>
+              <a:t>12/25/2017</a:t>
             </a:fld>
             <a:endParaRPr lang="en-US" dirty="0"/>
           </a:p>
@@ -11053,7 +11053,7 @@
           <a:p>
             <a:fld id="{76E86A4C-8E40-4F87-A4F0-01A0687C5742}" type="datetimeFigureOut">
               <a:rPr lang="en-US" dirty="0"/>
-              <a:t>12/24/2017</a:t>
+              <a:t>12/25/2017</a:t>
             </a:fld>
             <a:endParaRPr lang="en-US" dirty="0"/>
           </a:p>
@@ -12161,7 +12161,7 @@
           <a:p>
             <a:fld id="{35E72C73-2D91-4E12-BA25-F0AA0C03599B}" type="datetimeFigureOut">
               <a:rPr lang="en-US" dirty="0"/>
-              <a:t>12/24/2017</a:t>
+              <a:t>12/25/2017</a:t>
             </a:fld>
             <a:endParaRPr lang="en-US" dirty="0"/>
           </a:p>
@@ -13158,7 +13158,7 @@
           <a:p>
             <a:fld id="{2BE451C3-0FF4-47C4-B829-773ADF60F88C}" type="datetimeFigureOut">
               <a:rPr lang="en-US" dirty="0"/>
-              <a:t>12/24/2017</a:t>
+              <a:t>12/25/2017</a:t>
             </a:fld>
             <a:endParaRPr lang="en-US" dirty="0"/>
           </a:p>
@@ -13758,8 +13758,17 @@
           <a:p>
             <a:r>
               <a:rPr lang="it-IT" dirty="0" smtClean="0"/>
-              <a:t>Presenter: kamran abdi</a:t>
-            </a:r>
+              <a:t>Presenter</a:t>
+            </a:r>
+            <a:r>
+              <a:rPr lang="it-IT" smtClean="0"/>
+              <a:t>: </a:t>
+            </a:r>
+            <a:r>
+              <a:rPr lang="it-IT" smtClean="0"/>
+              <a:t>kamraN</a:t>
+            </a:r>
+            <a:endParaRPr lang="it-IT" dirty="0" smtClean="0"/>
           </a:p>
           <a:p>
             <a:endParaRPr lang="it-IT" dirty="0"/>
@@ -13776,11 +13785,11 @@
   <p:clrMapOvr>
     <a:masterClrMapping/>
   </p:clrMapOvr>
-  <mc:AlternateContent xmlns:mc="http://schemas.openxmlformats.org/markup-compatibility/2006">
-    <mc:Choice xmlns:p14="http://schemas.microsoft.com/office/powerpoint/2010/main" Requires="p14">
+  <mc:AlternateContent xmlns:mc="http://schemas.openxmlformats.org/markup-compatibility/2006" xmlns:p14="http://schemas.microsoft.com/office/powerpoint/2010/main">
+    <mc:Choice Requires="p14">
       <p:transition spd="slow" p14:dur="2000"/>
     </mc:Choice>
-    <mc:Fallback>
+    <mc:Fallback xmlns="">
       <p:transition spd="slow"/>
     </mc:Fallback>
   </mc:AlternateContent>
@@ -13914,11 +13923,11 @@
   <p:clrMapOvr>
     <a:masterClrMapping/>
   </p:clrMapOvr>
-  <mc:AlternateContent xmlns:mc="http://schemas.openxmlformats.org/markup-compatibility/2006">
-    <mc:Choice xmlns:p14="http://schemas.microsoft.com/office/powerpoint/2010/main" Requires="p14">
+  <mc:AlternateContent xmlns:mc="http://schemas.openxmlformats.org/markup-compatibility/2006" xmlns:p14="http://schemas.microsoft.com/office/powerpoint/2010/main">
+    <mc:Choice Requires="p14">
       <p:transition spd="slow" p14:dur="2000"/>
     </mc:Choice>
-    <mc:Fallback>
+    <mc:Fallback xmlns="">
       <p:transition spd="slow"/>
     </mc:Fallback>
   </mc:AlternateContent>
@@ -14254,11 +14263,11 @@
   <p:clrMapOvr>
     <a:masterClrMapping/>
   </p:clrMapOvr>
-  <mc:AlternateContent xmlns:mc="http://schemas.openxmlformats.org/markup-compatibility/2006">
-    <mc:Choice xmlns:p14="http://schemas.microsoft.com/office/powerpoint/2010/main" Requires="p14">
+  <mc:AlternateContent xmlns:mc="http://schemas.openxmlformats.org/markup-compatibility/2006" xmlns:p14="http://schemas.microsoft.com/office/powerpoint/2010/main">
+    <mc:Choice Requires="p14">
       <p:transition spd="slow" p14:dur="2000"/>
     </mc:Choice>
-    <mc:Fallback>
+    <mc:Fallback xmlns="">
       <p:transition spd="slow"/>
     </mc:Fallback>
   </mc:AlternateContent>
@@ -14423,11 +14432,11 @@
   <p:clrMapOvr>
     <a:masterClrMapping/>
   </p:clrMapOvr>
-  <mc:AlternateContent xmlns:mc="http://schemas.openxmlformats.org/markup-compatibility/2006">
-    <mc:Choice xmlns:p14="http://schemas.microsoft.com/office/powerpoint/2010/main" Requires="p14">
+  <mc:AlternateContent xmlns:mc="http://schemas.openxmlformats.org/markup-compatibility/2006" xmlns:p14="http://schemas.microsoft.com/office/powerpoint/2010/main">
+    <mc:Choice Requires="p14">
       <p:transition spd="slow" p14:dur="2000"/>
     </mc:Choice>
-    <mc:Fallback>
+    <mc:Fallback xmlns="">
       <p:transition spd="slow"/>
     </mc:Fallback>
   </mc:AlternateContent>
@@ -14988,11 +14997,11 @@
   <p:clrMapOvr>
     <a:masterClrMapping/>
   </p:clrMapOvr>
-  <mc:AlternateContent xmlns:mc="http://schemas.openxmlformats.org/markup-compatibility/2006">
-    <mc:Choice xmlns:p14="http://schemas.microsoft.com/office/powerpoint/2010/main" Requires="p14">
+  <mc:AlternateContent xmlns:mc="http://schemas.openxmlformats.org/markup-compatibility/2006" xmlns:p14="http://schemas.microsoft.com/office/powerpoint/2010/main">
+    <mc:Choice Requires="p14">
       <p:transition spd="slow" p14:dur="2000"/>
     </mc:Choice>
-    <mc:Fallback>
+    <mc:Fallback xmlns="">
       <p:transition spd="slow"/>
     </mc:Fallback>
   </mc:AlternateContent>
@@ -15482,11 +15491,11 @@
   <p:clrMapOvr>
     <a:masterClrMapping/>
   </p:clrMapOvr>
-  <mc:AlternateContent xmlns:mc="http://schemas.openxmlformats.org/markup-compatibility/2006">
-    <mc:Choice xmlns:p14="http://schemas.microsoft.com/office/powerpoint/2010/main" Requires="p14">
+  <mc:AlternateContent xmlns:mc="http://schemas.openxmlformats.org/markup-compatibility/2006" xmlns:p14="http://schemas.microsoft.com/office/powerpoint/2010/main">
+    <mc:Choice Requires="p14">
       <p:transition spd="slow" p14:dur="2000"/>
     </mc:Choice>
-    <mc:Fallback>
+    <mc:Fallback xmlns="">
       <p:transition spd="slow"/>
     </mc:Fallback>
   </mc:AlternateContent>
@@ -15850,11 +15859,11 @@
   <p:clrMapOvr>
     <a:masterClrMapping/>
   </p:clrMapOvr>
-  <mc:AlternateContent xmlns:mc="http://schemas.openxmlformats.org/markup-compatibility/2006">
-    <mc:Choice xmlns:p14="http://schemas.microsoft.com/office/powerpoint/2010/main" Requires="p14">
+  <mc:AlternateContent xmlns:mc="http://schemas.openxmlformats.org/markup-compatibility/2006" xmlns:p14="http://schemas.microsoft.com/office/powerpoint/2010/main">
+    <mc:Choice Requires="p14">
       <p:transition spd="slow" p14:dur="2000"/>
     </mc:Choice>
-    <mc:Fallback>
+    <mc:Fallback xmlns="">
       <p:transition spd="slow"/>
     </mc:Fallback>
   </mc:AlternateContent>
@@ -16299,11 +16308,11 @@
   <p:clrMapOvr>
     <a:masterClrMapping/>
   </p:clrMapOvr>
-  <mc:AlternateContent xmlns:mc="http://schemas.openxmlformats.org/markup-compatibility/2006">
-    <mc:Choice xmlns:p14="http://schemas.microsoft.com/office/powerpoint/2010/main" Requires="p14">
+  <mc:AlternateContent xmlns:mc="http://schemas.openxmlformats.org/markup-compatibility/2006" xmlns:p14="http://schemas.microsoft.com/office/powerpoint/2010/main">
+    <mc:Choice Requires="p14">
       <p:transition spd="slow" p14:dur="2000"/>
     </mc:Choice>
-    <mc:Fallback>
+    <mc:Fallback xmlns="">
       <p:transition spd="slow"/>
     </mc:Fallback>
   </mc:AlternateContent>
@@ -16485,11 +16494,11 @@
   <p:clrMapOvr>
     <a:masterClrMapping/>
   </p:clrMapOvr>
-  <mc:AlternateContent xmlns:mc="http://schemas.openxmlformats.org/markup-compatibility/2006">
-    <mc:Choice xmlns:p14="http://schemas.microsoft.com/office/powerpoint/2010/main" Requires="p14">
+  <mc:AlternateContent xmlns:mc="http://schemas.openxmlformats.org/markup-compatibility/2006" xmlns:p14="http://schemas.microsoft.com/office/powerpoint/2010/main">
+    <mc:Choice Requires="p14">
       <p:transition spd="slow" p14:dur="2000"/>
     </mc:Choice>
-    <mc:Fallback>
+    <mc:Fallback xmlns="">
       <p:transition spd="slow"/>
     </mc:Fallback>
   </mc:AlternateContent>
@@ -16917,11 +16926,11 @@
   <p:clrMapOvr>
     <a:masterClrMapping/>
   </p:clrMapOvr>
-  <mc:AlternateContent xmlns:mc="http://schemas.openxmlformats.org/markup-compatibility/2006">
-    <mc:Choice xmlns:p14="http://schemas.microsoft.com/office/powerpoint/2010/main" Requires="p14">
+  <mc:AlternateContent xmlns:mc="http://schemas.openxmlformats.org/markup-compatibility/2006" xmlns:p14="http://schemas.microsoft.com/office/powerpoint/2010/main">
+    <mc:Choice Requires="p14">
       <p:transition spd="slow" p14:dur="2000"/>
     </mc:Choice>
-    <mc:Fallback>
+    <mc:Fallback xmlns="">
       <p:transition spd="slow"/>
     </mc:Fallback>
   </mc:AlternateContent>

</xml_diff>